<commit_message>
Lidt protokol 👱🏿👲🏿  🔫👮
Ikke færdigt endnu, men altså.
</commit_message>
<xml_diff>
--- a/Rapport/figures/Golf_course_1_representation.pptx
+++ b/Rapport/figures/Golf_course_1_representation.pptx
@@ -6,6 +6,8 @@
   </p:sldMasterIdLst>
   <p:sldIdLst>
     <p:sldId id="256" r:id="rId2"/>
+    <p:sldId id="257" r:id="rId3"/>
+    <p:sldId id="258" r:id="rId4"/>
   </p:sldIdLst>
   <p:sldSz cx="9144000" cy="6858000" type="screen4x3"/>
   <p:notesSz cx="6858000" cy="9144000"/>
@@ -288,7 +290,7 @@
           <a:p>
             <a:fld id="{4751A7D4-8245-46D1-BEB1-C49E0A45E190}" type="datetimeFigureOut">
               <a:rPr lang="nb-NO" smtClean="0"/>
-              <a:t>11/09/15</a:t>
+              <a:t>15/10/15</a:t>
             </a:fld>
             <a:endParaRPr lang="nb-NO"/>
           </a:p>
@@ -458,7 +460,7 @@
           <a:p>
             <a:fld id="{4751A7D4-8245-46D1-BEB1-C49E0A45E190}" type="datetimeFigureOut">
               <a:rPr lang="nb-NO" smtClean="0"/>
-              <a:t>11/09/15</a:t>
+              <a:t>15/10/15</a:t>
             </a:fld>
             <a:endParaRPr lang="nb-NO"/>
           </a:p>
@@ -638,7 +640,7 @@
           <a:p>
             <a:fld id="{4751A7D4-8245-46D1-BEB1-C49E0A45E190}" type="datetimeFigureOut">
               <a:rPr lang="nb-NO" smtClean="0"/>
-              <a:t>11/09/15</a:t>
+              <a:t>15/10/15</a:t>
             </a:fld>
             <a:endParaRPr lang="nb-NO"/>
           </a:p>
@@ -808,7 +810,7 @@
           <a:p>
             <a:fld id="{4751A7D4-8245-46D1-BEB1-C49E0A45E190}" type="datetimeFigureOut">
               <a:rPr lang="nb-NO" smtClean="0"/>
-              <a:t>11/09/15</a:t>
+              <a:t>15/10/15</a:t>
             </a:fld>
             <a:endParaRPr lang="nb-NO"/>
           </a:p>
@@ -1054,7 +1056,7 @@
           <a:p>
             <a:fld id="{4751A7D4-8245-46D1-BEB1-C49E0A45E190}" type="datetimeFigureOut">
               <a:rPr lang="nb-NO" smtClean="0"/>
-              <a:t>11/09/15</a:t>
+              <a:t>15/10/15</a:t>
             </a:fld>
             <a:endParaRPr lang="nb-NO"/>
           </a:p>
@@ -1342,7 +1344,7 @@
           <a:p>
             <a:fld id="{4751A7D4-8245-46D1-BEB1-C49E0A45E190}" type="datetimeFigureOut">
               <a:rPr lang="nb-NO" smtClean="0"/>
-              <a:t>11/09/15</a:t>
+              <a:t>15/10/15</a:t>
             </a:fld>
             <a:endParaRPr lang="nb-NO"/>
           </a:p>
@@ -1764,7 +1766,7 @@
           <a:p>
             <a:fld id="{4751A7D4-8245-46D1-BEB1-C49E0A45E190}" type="datetimeFigureOut">
               <a:rPr lang="nb-NO" smtClean="0"/>
-              <a:t>11/09/15</a:t>
+              <a:t>15/10/15</a:t>
             </a:fld>
             <a:endParaRPr lang="nb-NO"/>
           </a:p>
@@ -1882,7 +1884,7 @@
           <a:p>
             <a:fld id="{4751A7D4-8245-46D1-BEB1-C49E0A45E190}" type="datetimeFigureOut">
               <a:rPr lang="nb-NO" smtClean="0"/>
-              <a:t>11/09/15</a:t>
+              <a:t>15/10/15</a:t>
             </a:fld>
             <a:endParaRPr lang="nb-NO"/>
           </a:p>
@@ -1977,7 +1979,7 @@
           <a:p>
             <a:fld id="{4751A7D4-8245-46D1-BEB1-C49E0A45E190}" type="datetimeFigureOut">
               <a:rPr lang="nb-NO" smtClean="0"/>
-              <a:t>11/09/15</a:t>
+              <a:t>15/10/15</a:t>
             </a:fld>
             <a:endParaRPr lang="nb-NO"/>
           </a:p>
@@ -2254,7 +2256,7 @@
           <a:p>
             <a:fld id="{4751A7D4-8245-46D1-BEB1-C49E0A45E190}" type="datetimeFigureOut">
               <a:rPr lang="nb-NO" smtClean="0"/>
-              <a:t>11/09/15</a:t>
+              <a:t>15/10/15</a:t>
             </a:fld>
             <a:endParaRPr lang="nb-NO"/>
           </a:p>
@@ -2507,7 +2509,7 @@
           <a:p>
             <a:fld id="{4751A7D4-8245-46D1-BEB1-C49E0A45E190}" type="datetimeFigureOut">
               <a:rPr lang="nb-NO" smtClean="0"/>
-              <a:t>11/09/15</a:t>
+              <a:t>15/10/15</a:t>
             </a:fld>
             <a:endParaRPr lang="nb-NO"/>
           </a:p>
@@ -2720,7 +2722,7 @@
           <a:p>
             <a:fld id="{4751A7D4-8245-46D1-BEB1-C49E0A45E190}" type="datetimeFigureOut">
               <a:rPr lang="nb-NO" smtClean="0"/>
-              <a:t>11/09/15</a:t>
+              <a:t>15/10/15</a:t>
             </a:fld>
             <a:endParaRPr lang="nb-NO"/>
           </a:p>
@@ -4163,6 +4165,1440 @@
 </p:sld>
 </file>
 
+<file path=ppt/slides/slide2.xml><?xml version="1.0" encoding="utf-8"?>
+<p:sld xmlns:a="http://schemas.openxmlformats.org/drawingml/2006/main" xmlns:r="http://schemas.openxmlformats.org/officeDocument/2006/relationships" xmlns:p="http://schemas.openxmlformats.org/presentationml/2006/main">
+  <p:cSld>
+    <p:spTree>
+      <p:nvGrpSpPr>
+        <p:cNvPr id="1" name=""/>
+        <p:cNvGrpSpPr/>
+        <p:nvPr/>
+      </p:nvGrpSpPr>
+      <p:grpSpPr>
+        <a:xfrm>
+          <a:off x="0" y="0"/>
+          <a:ext cx="0" cy="0"/>
+          <a:chOff x="0" y="0"/>
+          <a:chExt cx="0" cy="0"/>
+        </a:xfrm>
+      </p:grpSpPr>
+      <p:sp>
+        <p:nvSpPr>
+          <p:cNvPr id="6" name="Tekstfelt 5"/>
+          <p:cNvSpPr txBox="1"/>
+          <p:nvPr/>
+        </p:nvSpPr>
+        <p:spPr>
+          <a:xfrm>
+            <a:off x="3131840" y="404664"/>
+            <a:ext cx="1080120" cy="1070035"/>
+          </a:xfrm>
+          <a:prstGeom prst="ellipse">
+            <a:avLst/>
+          </a:prstGeom>
+          <a:effectLst/>
+        </p:spPr>
+        <p:style>
+          <a:lnRef idx="3">
+            <a:schemeClr val="lt1"/>
+          </a:lnRef>
+          <a:fillRef idx="1">
+            <a:schemeClr val="accent1"/>
+          </a:fillRef>
+          <a:effectRef idx="1">
+            <a:schemeClr val="accent1"/>
+          </a:effectRef>
+          <a:fontRef idx="minor">
+            <a:schemeClr val="lt1"/>
+          </a:fontRef>
+        </p:style>
+        <p:txBody>
+          <a:bodyPr wrap="square" rtlCol="0">
+            <a:spAutoFit/>
+          </a:bodyPr>
+          <a:lstStyle/>
+          <a:p>
+            <a:endParaRPr lang="da-DK" dirty="0"/>
+          </a:p>
+        </p:txBody>
+      </p:sp>
+      <p:sp>
+        <p:nvSpPr>
+          <p:cNvPr id="7" name="Tekstfelt 6"/>
+          <p:cNvSpPr txBox="1"/>
+          <p:nvPr/>
+        </p:nvSpPr>
+        <p:spPr>
+          <a:xfrm>
+            <a:off x="3275856" y="764704"/>
+            <a:ext cx="840194" cy="369332"/>
+          </a:xfrm>
+          <a:prstGeom prst="rect">
+            <a:avLst/>
+          </a:prstGeom>
+          <a:noFill/>
+        </p:spPr>
+        <p:txBody>
+          <a:bodyPr wrap="none" rtlCol="0">
+            <a:spAutoFit/>
+          </a:bodyPr>
+          <a:lstStyle/>
+          <a:p>
+            <a:r>
+              <a:rPr lang="da-DK" dirty="0" smtClean="0">
+                <a:solidFill>
+                  <a:schemeClr val="bg1"/>
+                </a:solidFill>
+              </a:rPr>
+              <a:t>MN (1)</a:t>
+            </a:r>
+          </a:p>
+        </p:txBody>
+      </p:sp>
+      <p:sp>
+        <p:nvSpPr>
+          <p:cNvPr id="10" name="Tekstfelt 9"/>
+          <p:cNvSpPr txBox="1"/>
+          <p:nvPr/>
+        </p:nvSpPr>
+        <p:spPr>
+          <a:xfrm>
+            <a:off x="3419872" y="1772816"/>
+            <a:ext cx="504056" cy="519351"/>
+          </a:xfrm>
+          <a:prstGeom prst="ellipse">
+            <a:avLst/>
+          </a:prstGeom>
+          <a:effectLst/>
+        </p:spPr>
+        <p:style>
+          <a:lnRef idx="3">
+            <a:schemeClr val="lt1"/>
+          </a:lnRef>
+          <a:fillRef idx="1">
+            <a:schemeClr val="accent1"/>
+          </a:fillRef>
+          <a:effectRef idx="1">
+            <a:schemeClr val="accent1"/>
+          </a:effectRef>
+          <a:fontRef idx="minor">
+            <a:schemeClr val="lt1"/>
+          </a:fontRef>
+        </p:style>
+        <p:txBody>
+          <a:bodyPr wrap="square" rtlCol="0">
+            <a:spAutoFit/>
+          </a:bodyPr>
+          <a:lstStyle/>
+          <a:p>
+            <a:pPr algn="ctr"/>
+            <a:r>
+              <a:rPr lang="da-DK" dirty="0" smtClean="0"/>
+              <a:t>2</a:t>
+            </a:r>
+            <a:endParaRPr lang="da-DK" dirty="0"/>
+          </a:p>
+        </p:txBody>
+      </p:sp>
+      <p:sp>
+        <p:nvSpPr>
+          <p:cNvPr id="14" name="Tekstfelt 13"/>
+          <p:cNvSpPr txBox="1"/>
+          <p:nvPr/>
+        </p:nvSpPr>
+        <p:spPr>
+          <a:xfrm>
+            <a:off x="2627784" y="2708920"/>
+            <a:ext cx="504056" cy="519351"/>
+          </a:xfrm>
+          <a:prstGeom prst="ellipse">
+            <a:avLst/>
+          </a:prstGeom>
+          <a:effectLst/>
+        </p:spPr>
+        <p:style>
+          <a:lnRef idx="3">
+            <a:schemeClr val="lt1"/>
+          </a:lnRef>
+          <a:fillRef idx="1">
+            <a:schemeClr val="accent1"/>
+          </a:fillRef>
+          <a:effectRef idx="1">
+            <a:schemeClr val="accent1"/>
+          </a:effectRef>
+          <a:fontRef idx="minor">
+            <a:schemeClr val="lt1"/>
+          </a:fontRef>
+        </p:style>
+        <p:txBody>
+          <a:bodyPr wrap="square" rtlCol="0">
+            <a:spAutoFit/>
+          </a:bodyPr>
+          <a:lstStyle/>
+          <a:p>
+            <a:pPr algn="ctr"/>
+            <a:r>
+              <a:rPr lang="da-DK" dirty="0" smtClean="0"/>
+              <a:t>3</a:t>
+            </a:r>
+            <a:endParaRPr lang="da-DK" dirty="0"/>
+          </a:p>
+        </p:txBody>
+      </p:sp>
+      <p:sp>
+        <p:nvSpPr>
+          <p:cNvPr id="17" name="Tekstfelt 16"/>
+          <p:cNvSpPr txBox="1"/>
+          <p:nvPr/>
+        </p:nvSpPr>
+        <p:spPr>
+          <a:xfrm>
+            <a:off x="4211960" y="2708920"/>
+            <a:ext cx="504056" cy="519351"/>
+          </a:xfrm>
+          <a:prstGeom prst="ellipse">
+            <a:avLst/>
+          </a:prstGeom>
+          <a:effectLst/>
+        </p:spPr>
+        <p:style>
+          <a:lnRef idx="3">
+            <a:schemeClr val="lt1"/>
+          </a:lnRef>
+          <a:fillRef idx="1">
+            <a:schemeClr val="accent1"/>
+          </a:fillRef>
+          <a:effectRef idx="1">
+            <a:schemeClr val="accent1"/>
+          </a:effectRef>
+          <a:fontRef idx="minor">
+            <a:schemeClr val="lt1"/>
+          </a:fontRef>
+        </p:style>
+        <p:txBody>
+          <a:bodyPr wrap="square" rtlCol="0">
+            <a:spAutoFit/>
+          </a:bodyPr>
+          <a:lstStyle/>
+          <a:p>
+            <a:pPr algn="ctr"/>
+            <a:r>
+              <a:rPr lang="da-DK" dirty="0" smtClean="0"/>
+              <a:t>4</a:t>
+            </a:r>
+            <a:endParaRPr lang="da-DK" dirty="0"/>
+          </a:p>
+        </p:txBody>
+      </p:sp>
+      <p:sp>
+        <p:nvSpPr>
+          <p:cNvPr id="18" name="Tekstfelt 17"/>
+          <p:cNvSpPr txBox="1"/>
+          <p:nvPr/>
+        </p:nvSpPr>
+        <p:spPr>
+          <a:xfrm>
+            <a:off x="1763688" y="3645024"/>
+            <a:ext cx="504056" cy="519351"/>
+          </a:xfrm>
+          <a:prstGeom prst="ellipse">
+            <a:avLst/>
+          </a:prstGeom>
+          <a:effectLst/>
+        </p:spPr>
+        <p:style>
+          <a:lnRef idx="3">
+            <a:schemeClr val="lt1"/>
+          </a:lnRef>
+          <a:fillRef idx="1">
+            <a:schemeClr val="accent1"/>
+          </a:fillRef>
+          <a:effectRef idx="1">
+            <a:schemeClr val="accent1"/>
+          </a:effectRef>
+          <a:fontRef idx="minor">
+            <a:schemeClr val="lt1"/>
+          </a:fontRef>
+        </p:style>
+        <p:txBody>
+          <a:bodyPr wrap="square" rtlCol="0">
+            <a:spAutoFit/>
+          </a:bodyPr>
+          <a:lstStyle/>
+          <a:p>
+            <a:pPr algn="ctr"/>
+            <a:r>
+              <a:rPr lang="da-DK" dirty="0" smtClean="0"/>
+              <a:t>5</a:t>
+            </a:r>
+            <a:endParaRPr lang="da-DK" dirty="0"/>
+          </a:p>
+        </p:txBody>
+      </p:sp>
+      <p:sp>
+        <p:nvSpPr>
+          <p:cNvPr id="19" name="Tekstfelt 18"/>
+          <p:cNvSpPr txBox="1"/>
+          <p:nvPr/>
+        </p:nvSpPr>
+        <p:spPr>
+          <a:xfrm>
+            <a:off x="2627784" y="3789040"/>
+            <a:ext cx="504056" cy="519351"/>
+          </a:xfrm>
+          <a:prstGeom prst="ellipse">
+            <a:avLst/>
+          </a:prstGeom>
+          <a:effectLst/>
+        </p:spPr>
+        <p:style>
+          <a:lnRef idx="3">
+            <a:schemeClr val="lt1"/>
+          </a:lnRef>
+          <a:fillRef idx="1">
+            <a:schemeClr val="accent1"/>
+          </a:fillRef>
+          <a:effectRef idx="1">
+            <a:schemeClr val="accent1"/>
+          </a:effectRef>
+          <a:fontRef idx="minor">
+            <a:schemeClr val="lt1"/>
+          </a:fontRef>
+        </p:style>
+        <p:txBody>
+          <a:bodyPr wrap="square" rtlCol="0">
+            <a:spAutoFit/>
+          </a:bodyPr>
+          <a:lstStyle/>
+          <a:p>
+            <a:pPr algn="ctr"/>
+            <a:r>
+              <a:rPr lang="da-DK" dirty="0" smtClean="0"/>
+              <a:t>6</a:t>
+            </a:r>
+            <a:endParaRPr lang="da-DK" dirty="0"/>
+          </a:p>
+        </p:txBody>
+      </p:sp>
+      <p:sp>
+        <p:nvSpPr>
+          <p:cNvPr id="20" name="Tekstfelt 19"/>
+          <p:cNvSpPr txBox="1"/>
+          <p:nvPr/>
+        </p:nvSpPr>
+        <p:spPr>
+          <a:xfrm>
+            <a:off x="3491880" y="3645024"/>
+            <a:ext cx="504056" cy="519351"/>
+          </a:xfrm>
+          <a:prstGeom prst="ellipse">
+            <a:avLst/>
+          </a:prstGeom>
+          <a:effectLst/>
+        </p:spPr>
+        <p:style>
+          <a:lnRef idx="3">
+            <a:schemeClr val="lt1"/>
+          </a:lnRef>
+          <a:fillRef idx="1">
+            <a:schemeClr val="accent1"/>
+          </a:fillRef>
+          <a:effectRef idx="1">
+            <a:schemeClr val="accent1"/>
+          </a:effectRef>
+          <a:fontRef idx="minor">
+            <a:schemeClr val="lt1"/>
+          </a:fontRef>
+        </p:style>
+        <p:txBody>
+          <a:bodyPr wrap="square" rtlCol="0">
+            <a:spAutoFit/>
+          </a:bodyPr>
+          <a:lstStyle/>
+          <a:p>
+            <a:pPr algn="ctr"/>
+            <a:r>
+              <a:rPr lang="da-DK" dirty="0" smtClean="0"/>
+              <a:t>7</a:t>
+            </a:r>
+            <a:endParaRPr lang="da-DK" dirty="0"/>
+          </a:p>
+        </p:txBody>
+      </p:sp>
+      <p:sp>
+        <p:nvSpPr>
+          <p:cNvPr id="21" name="Tekstfelt 20"/>
+          <p:cNvSpPr txBox="1"/>
+          <p:nvPr/>
+        </p:nvSpPr>
+        <p:spPr>
+          <a:xfrm>
+            <a:off x="5004048" y="3645024"/>
+            <a:ext cx="504056" cy="519351"/>
+          </a:xfrm>
+          <a:prstGeom prst="ellipse">
+            <a:avLst/>
+          </a:prstGeom>
+          <a:effectLst/>
+        </p:spPr>
+        <p:style>
+          <a:lnRef idx="3">
+            <a:schemeClr val="lt1"/>
+          </a:lnRef>
+          <a:fillRef idx="1">
+            <a:schemeClr val="accent1"/>
+          </a:fillRef>
+          <a:effectRef idx="1">
+            <a:schemeClr val="accent1"/>
+          </a:effectRef>
+          <a:fontRef idx="minor">
+            <a:schemeClr val="lt1"/>
+          </a:fontRef>
+        </p:style>
+        <p:txBody>
+          <a:bodyPr wrap="square" rtlCol="0">
+            <a:spAutoFit/>
+          </a:bodyPr>
+          <a:lstStyle/>
+          <a:p>
+            <a:pPr algn="ctr"/>
+            <a:r>
+              <a:rPr lang="da-DK" dirty="0" smtClean="0"/>
+              <a:t>8</a:t>
+            </a:r>
+            <a:endParaRPr lang="da-DK" dirty="0"/>
+          </a:p>
+        </p:txBody>
+      </p:sp>
+      <p:cxnSp>
+        <p:nvCxnSpPr>
+          <p:cNvPr id="23" name="Lige forbindelse 22"/>
+          <p:cNvCxnSpPr>
+            <a:stCxn id="6" idx="4"/>
+            <a:endCxn id="10" idx="0"/>
+          </p:cNvCxnSpPr>
+          <p:nvPr/>
+        </p:nvCxnSpPr>
+        <p:spPr>
+          <a:xfrm>
+            <a:off x="3671900" y="1474699"/>
+            <a:ext cx="0" cy="298117"/>
+          </a:xfrm>
+          <a:prstGeom prst="line">
+            <a:avLst/>
+          </a:prstGeom>
+        </p:spPr>
+        <p:style>
+          <a:lnRef idx="2">
+            <a:schemeClr val="accent1"/>
+          </a:lnRef>
+          <a:fillRef idx="0">
+            <a:schemeClr val="accent1"/>
+          </a:fillRef>
+          <a:effectRef idx="1">
+            <a:schemeClr val="accent1"/>
+          </a:effectRef>
+          <a:fontRef idx="minor">
+            <a:schemeClr val="tx1"/>
+          </a:fontRef>
+        </p:style>
+      </p:cxnSp>
+      <p:cxnSp>
+        <p:nvCxnSpPr>
+          <p:cNvPr id="26" name="Lige forbindelse 25"/>
+          <p:cNvCxnSpPr>
+            <a:stCxn id="10" idx="5"/>
+            <a:endCxn id="17" idx="1"/>
+          </p:cNvCxnSpPr>
+          <p:nvPr/>
+        </p:nvCxnSpPr>
+        <p:spPr>
+          <a:xfrm>
+            <a:off x="3850111" y="2216110"/>
+            <a:ext cx="435666" cy="568867"/>
+          </a:xfrm>
+          <a:prstGeom prst="line">
+            <a:avLst/>
+          </a:prstGeom>
+        </p:spPr>
+        <p:style>
+          <a:lnRef idx="2">
+            <a:schemeClr val="accent1"/>
+          </a:lnRef>
+          <a:fillRef idx="0">
+            <a:schemeClr val="accent1"/>
+          </a:fillRef>
+          <a:effectRef idx="1">
+            <a:schemeClr val="accent1"/>
+          </a:effectRef>
+          <a:fontRef idx="minor">
+            <a:schemeClr val="tx1"/>
+          </a:fontRef>
+        </p:style>
+      </p:cxnSp>
+      <p:cxnSp>
+        <p:nvCxnSpPr>
+          <p:cNvPr id="28" name="Lige forbindelse 27"/>
+          <p:cNvCxnSpPr>
+            <a:stCxn id="17" idx="5"/>
+            <a:endCxn id="21" idx="1"/>
+          </p:cNvCxnSpPr>
+          <p:nvPr/>
+        </p:nvCxnSpPr>
+        <p:spPr>
+          <a:xfrm>
+            <a:off x="4642199" y="3152214"/>
+            <a:ext cx="435666" cy="568867"/>
+          </a:xfrm>
+          <a:prstGeom prst="line">
+            <a:avLst/>
+          </a:prstGeom>
+        </p:spPr>
+        <p:style>
+          <a:lnRef idx="2">
+            <a:schemeClr val="accent1"/>
+          </a:lnRef>
+          <a:fillRef idx="0">
+            <a:schemeClr val="accent1"/>
+          </a:fillRef>
+          <a:effectRef idx="1">
+            <a:schemeClr val="accent1"/>
+          </a:effectRef>
+          <a:fontRef idx="minor">
+            <a:schemeClr val="tx1"/>
+          </a:fontRef>
+        </p:style>
+      </p:cxnSp>
+      <p:cxnSp>
+        <p:nvCxnSpPr>
+          <p:cNvPr id="31" name="Lige forbindelse 30"/>
+          <p:cNvCxnSpPr>
+            <a:stCxn id="10" idx="3"/>
+            <a:endCxn id="14" idx="7"/>
+          </p:cNvCxnSpPr>
+          <p:nvPr/>
+        </p:nvCxnSpPr>
+        <p:spPr>
+          <a:xfrm flipH="1">
+            <a:off x="3058023" y="2216110"/>
+            <a:ext cx="435666" cy="568867"/>
+          </a:xfrm>
+          <a:prstGeom prst="line">
+            <a:avLst/>
+          </a:prstGeom>
+        </p:spPr>
+        <p:style>
+          <a:lnRef idx="2">
+            <a:schemeClr val="accent1"/>
+          </a:lnRef>
+          <a:fillRef idx="0">
+            <a:schemeClr val="accent1"/>
+          </a:fillRef>
+          <a:effectRef idx="1">
+            <a:schemeClr val="accent1"/>
+          </a:effectRef>
+          <a:fontRef idx="minor">
+            <a:schemeClr val="tx1"/>
+          </a:fontRef>
+        </p:style>
+      </p:cxnSp>
+      <p:cxnSp>
+        <p:nvCxnSpPr>
+          <p:cNvPr id="33" name="Lige forbindelse 32"/>
+          <p:cNvCxnSpPr>
+            <a:stCxn id="14" idx="3"/>
+            <a:endCxn id="18" idx="7"/>
+          </p:cNvCxnSpPr>
+          <p:nvPr/>
+        </p:nvCxnSpPr>
+        <p:spPr>
+          <a:xfrm flipH="1">
+            <a:off x="2193927" y="3152214"/>
+            <a:ext cx="507674" cy="568867"/>
+          </a:xfrm>
+          <a:prstGeom prst="line">
+            <a:avLst/>
+          </a:prstGeom>
+        </p:spPr>
+        <p:style>
+          <a:lnRef idx="2">
+            <a:schemeClr val="accent1"/>
+          </a:lnRef>
+          <a:fillRef idx="0">
+            <a:schemeClr val="accent1"/>
+          </a:fillRef>
+          <a:effectRef idx="1">
+            <a:schemeClr val="accent1"/>
+          </a:effectRef>
+          <a:fontRef idx="minor">
+            <a:schemeClr val="tx1"/>
+          </a:fontRef>
+        </p:style>
+      </p:cxnSp>
+      <p:cxnSp>
+        <p:nvCxnSpPr>
+          <p:cNvPr id="35" name="Lige forbindelse 34"/>
+          <p:cNvCxnSpPr>
+            <a:stCxn id="14" idx="5"/>
+            <a:endCxn id="20" idx="1"/>
+          </p:cNvCxnSpPr>
+          <p:nvPr/>
+        </p:nvCxnSpPr>
+        <p:spPr>
+          <a:xfrm>
+            <a:off x="3058023" y="3152214"/>
+            <a:ext cx="507674" cy="568867"/>
+          </a:xfrm>
+          <a:prstGeom prst="line">
+            <a:avLst/>
+          </a:prstGeom>
+        </p:spPr>
+        <p:style>
+          <a:lnRef idx="2">
+            <a:schemeClr val="accent1"/>
+          </a:lnRef>
+          <a:fillRef idx="0">
+            <a:schemeClr val="accent1"/>
+          </a:fillRef>
+          <a:effectRef idx="1">
+            <a:schemeClr val="accent1"/>
+          </a:effectRef>
+          <a:fontRef idx="minor">
+            <a:schemeClr val="tx1"/>
+          </a:fontRef>
+        </p:style>
+      </p:cxnSp>
+      <p:cxnSp>
+        <p:nvCxnSpPr>
+          <p:cNvPr id="38" name="Lige forbindelse 37"/>
+          <p:cNvCxnSpPr>
+            <a:stCxn id="14" idx="4"/>
+            <a:endCxn id="19" idx="0"/>
+          </p:cNvCxnSpPr>
+          <p:nvPr/>
+        </p:nvCxnSpPr>
+        <p:spPr>
+          <a:xfrm>
+            <a:off x="2879812" y="3228271"/>
+            <a:ext cx="0" cy="560769"/>
+          </a:xfrm>
+          <a:prstGeom prst="line">
+            <a:avLst/>
+          </a:prstGeom>
+        </p:spPr>
+        <p:style>
+          <a:lnRef idx="2">
+            <a:schemeClr val="accent1"/>
+          </a:lnRef>
+          <a:fillRef idx="0">
+            <a:schemeClr val="accent1"/>
+          </a:fillRef>
+          <a:effectRef idx="1">
+            <a:schemeClr val="accent1"/>
+          </a:effectRef>
+          <a:fontRef idx="minor">
+            <a:schemeClr val="tx1"/>
+          </a:fontRef>
+        </p:style>
+      </p:cxnSp>
+      <p:sp>
+        <p:nvSpPr>
+          <p:cNvPr id="39" name="Tekstfelt 38"/>
+          <p:cNvSpPr txBox="1"/>
+          <p:nvPr/>
+        </p:nvSpPr>
+        <p:spPr>
+          <a:xfrm>
+            <a:off x="5148064" y="1844824"/>
+            <a:ext cx="1083875" cy="369332"/>
+          </a:xfrm>
+          <a:prstGeom prst="rect">
+            <a:avLst/>
+          </a:prstGeom>
+          <a:noFill/>
+        </p:spPr>
+        <p:txBody>
+          <a:bodyPr wrap="none" rtlCol="0">
+            <a:spAutoFit/>
+          </a:bodyPr>
+          <a:lstStyle/>
+          <a:p>
+            <a:r>
+              <a:rPr lang="da-DK" dirty="0" smtClean="0"/>
+              <a:t>First level</a:t>
+            </a:r>
+            <a:endParaRPr lang="da-DK" dirty="0"/>
+          </a:p>
+        </p:txBody>
+      </p:sp>
+      <p:sp>
+        <p:nvSpPr>
+          <p:cNvPr id="40" name="Tekstfelt 39"/>
+          <p:cNvSpPr txBox="1"/>
+          <p:nvPr/>
+        </p:nvSpPr>
+        <p:spPr>
+          <a:xfrm>
+            <a:off x="5652120" y="2780928"/>
+            <a:ext cx="1359567" cy="369332"/>
+          </a:xfrm>
+          <a:prstGeom prst="rect">
+            <a:avLst/>
+          </a:prstGeom>
+          <a:noFill/>
+        </p:spPr>
+        <p:txBody>
+          <a:bodyPr wrap="none" rtlCol="0">
+            <a:spAutoFit/>
+          </a:bodyPr>
+          <a:lstStyle/>
+          <a:p>
+            <a:r>
+              <a:rPr lang="da-DK" dirty="0" smtClean="0"/>
+              <a:t>Second level</a:t>
+            </a:r>
+            <a:endParaRPr lang="da-DK" dirty="0"/>
+          </a:p>
+        </p:txBody>
+      </p:sp>
+      <p:sp>
+        <p:nvSpPr>
+          <p:cNvPr id="41" name="Tekstfelt 40"/>
+          <p:cNvSpPr txBox="1"/>
+          <p:nvPr/>
+        </p:nvSpPr>
+        <p:spPr>
+          <a:xfrm>
+            <a:off x="6444208" y="3789040"/>
+            <a:ext cx="1165253" cy="369332"/>
+          </a:xfrm>
+          <a:prstGeom prst="rect">
+            <a:avLst/>
+          </a:prstGeom>
+          <a:noFill/>
+        </p:spPr>
+        <p:txBody>
+          <a:bodyPr wrap="none" rtlCol="0">
+            <a:spAutoFit/>
+          </a:bodyPr>
+          <a:lstStyle/>
+          <a:p>
+            <a:r>
+              <a:rPr lang="da-DK" dirty="0" smtClean="0"/>
+              <a:t>Third level</a:t>
+            </a:r>
+            <a:endParaRPr lang="da-DK" dirty="0"/>
+          </a:p>
+        </p:txBody>
+      </p:sp>
+    </p:spTree>
+    <p:extLst>
+      <p:ext uri="{BB962C8B-B14F-4D97-AF65-F5344CB8AC3E}">
+        <p14:creationId xmlns:p14="http://schemas.microsoft.com/office/powerpoint/2010/main" val="3265520504"/>
+      </p:ext>
+    </p:extLst>
+  </p:cSld>
+  <p:clrMapOvr>
+    <a:masterClrMapping/>
+  </p:clrMapOvr>
+</p:sld>
+</file>
+
+<file path=ppt/slides/slide3.xml><?xml version="1.0" encoding="utf-8"?>
+<p:sld xmlns:a="http://schemas.openxmlformats.org/drawingml/2006/main" xmlns:r="http://schemas.openxmlformats.org/officeDocument/2006/relationships" xmlns:p="http://schemas.openxmlformats.org/presentationml/2006/main">
+  <p:cSld>
+    <p:spTree>
+      <p:nvGrpSpPr>
+        <p:cNvPr id="1" name=""/>
+        <p:cNvGrpSpPr/>
+        <p:nvPr/>
+      </p:nvGrpSpPr>
+      <p:grpSpPr>
+        <a:xfrm>
+          <a:off x="0" y="0"/>
+          <a:ext cx="0" cy="0"/>
+          <a:chOff x="0" y="0"/>
+          <a:chExt cx="0" cy="0"/>
+        </a:xfrm>
+      </p:grpSpPr>
+      <p:sp>
+        <p:nvSpPr>
+          <p:cNvPr id="4" name="Tekstfelt 3"/>
+          <p:cNvSpPr txBox="1"/>
+          <p:nvPr/>
+        </p:nvSpPr>
+        <p:spPr>
+          <a:xfrm>
+            <a:off x="3131840" y="404664"/>
+            <a:ext cx="1080120" cy="1070035"/>
+          </a:xfrm>
+          <a:prstGeom prst="ellipse">
+            <a:avLst/>
+          </a:prstGeom>
+          <a:effectLst/>
+        </p:spPr>
+        <p:style>
+          <a:lnRef idx="3">
+            <a:schemeClr val="lt1"/>
+          </a:lnRef>
+          <a:fillRef idx="1">
+            <a:schemeClr val="accent1"/>
+          </a:fillRef>
+          <a:effectRef idx="1">
+            <a:schemeClr val="accent1"/>
+          </a:effectRef>
+          <a:fontRef idx="minor">
+            <a:schemeClr val="lt1"/>
+          </a:fontRef>
+        </p:style>
+        <p:txBody>
+          <a:bodyPr wrap="square" rtlCol="0">
+            <a:spAutoFit/>
+          </a:bodyPr>
+          <a:lstStyle/>
+          <a:p>
+            <a:endParaRPr lang="da-DK" dirty="0"/>
+          </a:p>
+        </p:txBody>
+      </p:sp>
+      <p:sp>
+        <p:nvSpPr>
+          <p:cNvPr id="5" name="Tekstfelt 4"/>
+          <p:cNvSpPr txBox="1"/>
+          <p:nvPr/>
+        </p:nvSpPr>
+        <p:spPr>
+          <a:xfrm>
+            <a:off x="3275856" y="764704"/>
+            <a:ext cx="840194" cy="369332"/>
+          </a:xfrm>
+          <a:prstGeom prst="rect">
+            <a:avLst/>
+          </a:prstGeom>
+          <a:noFill/>
+        </p:spPr>
+        <p:txBody>
+          <a:bodyPr wrap="none" rtlCol="0">
+            <a:spAutoFit/>
+          </a:bodyPr>
+          <a:lstStyle/>
+          <a:p>
+            <a:r>
+              <a:rPr lang="da-DK" dirty="0" smtClean="0">
+                <a:solidFill>
+                  <a:schemeClr val="bg1"/>
+                </a:solidFill>
+              </a:rPr>
+              <a:t>MN (1)</a:t>
+            </a:r>
+          </a:p>
+        </p:txBody>
+      </p:sp>
+      <p:sp>
+        <p:nvSpPr>
+          <p:cNvPr id="6" name="Tekstfelt 5"/>
+          <p:cNvSpPr txBox="1"/>
+          <p:nvPr/>
+        </p:nvSpPr>
+        <p:spPr>
+          <a:xfrm>
+            <a:off x="3419872" y="1772816"/>
+            <a:ext cx="504056" cy="519351"/>
+          </a:xfrm>
+          <a:prstGeom prst="ellipse">
+            <a:avLst/>
+          </a:prstGeom>
+          <a:effectLst/>
+        </p:spPr>
+        <p:style>
+          <a:lnRef idx="3">
+            <a:schemeClr val="lt1"/>
+          </a:lnRef>
+          <a:fillRef idx="1">
+            <a:schemeClr val="accent1"/>
+          </a:fillRef>
+          <a:effectRef idx="1">
+            <a:schemeClr val="accent1"/>
+          </a:effectRef>
+          <a:fontRef idx="minor">
+            <a:schemeClr val="lt1"/>
+          </a:fontRef>
+        </p:style>
+        <p:txBody>
+          <a:bodyPr wrap="square" rtlCol="0">
+            <a:spAutoFit/>
+          </a:bodyPr>
+          <a:lstStyle/>
+          <a:p>
+            <a:pPr algn="ctr"/>
+            <a:r>
+              <a:rPr lang="da-DK" dirty="0" smtClean="0"/>
+              <a:t>2</a:t>
+            </a:r>
+            <a:endParaRPr lang="da-DK" dirty="0"/>
+          </a:p>
+        </p:txBody>
+      </p:sp>
+      <p:sp>
+        <p:nvSpPr>
+          <p:cNvPr id="8" name="Tekstfelt 7"/>
+          <p:cNvSpPr txBox="1"/>
+          <p:nvPr/>
+        </p:nvSpPr>
+        <p:spPr>
+          <a:xfrm>
+            <a:off x="4211960" y="2708920"/>
+            <a:ext cx="504056" cy="519351"/>
+          </a:xfrm>
+          <a:prstGeom prst="ellipse">
+            <a:avLst/>
+          </a:prstGeom>
+          <a:effectLst/>
+        </p:spPr>
+        <p:style>
+          <a:lnRef idx="3">
+            <a:schemeClr val="lt1"/>
+          </a:lnRef>
+          <a:fillRef idx="1">
+            <a:schemeClr val="accent1"/>
+          </a:fillRef>
+          <a:effectRef idx="1">
+            <a:schemeClr val="accent1"/>
+          </a:effectRef>
+          <a:fontRef idx="minor">
+            <a:schemeClr val="lt1"/>
+          </a:fontRef>
+        </p:style>
+        <p:txBody>
+          <a:bodyPr wrap="square" rtlCol="0">
+            <a:spAutoFit/>
+          </a:bodyPr>
+          <a:lstStyle/>
+          <a:p>
+            <a:pPr algn="ctr"/>
+            <a:r>
+              <a:rPr lang="da-DK" dirty="0" smtClean="0"/>
+              <a:t>4</a:t>
+            </a:r>
+            <a:endParaRPr lang="da-DK" dirty="0"/>
+          </a:p>
+        </p:txBody>
+      </p:sp>
+      <p:sp>
+        <p:nvSpPr>
+          <p:cNvPr id="9" name="Tekstfelt 8"/>
+          <p:cNvSpPr txBox="1"/>
+          <p:nvPr/>
+        </p:nvSpPr>
+        <p:spPr>
+          <a:xfrm>
+            <a:off x="2915816" y="4509120"/>
+            <a:ext cx="504056" cy="519351"/>
+          </a:xfrm>
+          <a:prstGeom prst="ellipse">
+            <a:avLst/>
+          </a:prstGeom>
+          <a:effectLst/>
+        </p:spPr>
+        <p:style>
+          <a:lnRef idx="3">
+            <a:schemeClr val="lt1"/>
+          </a:lnRef>
+          <a:fillRef idx="1">
+            <a:schemeClr val="accent1"/>
+          </a:fillRef>
+          <a:effectRef idx="1">
+            <a:schemeClr val="accent1"/>
+          </a:effectRef>
+          <a:fontRef idx="minor">
+            <a:schemeClr val="lt1"/>
+          </a:fontRef>
+        </p:style>
+        <p:txBody>
+          <a:bodyPr wrap="square" rtlCol="0">
+            <a:spAutoFit/>
+          </a:bodyPr>
+          <a:lstStyle/>
+          <a:p>
+            <a:pPr algn="ctr"/>
+            <a:r>
+              <a:rPr lang="da-DK" dirty="0" smtClean="0"/>
+              <a:t>5</a:t>
+            </a:r>
+            <a:endParaRPr lang="da-DK" dirty="0"/>
+          </a:p>
+        </p:txBody>
+      </p:sp>
+      <p:sp>
+        <p:nvSpPr>
+          <p:cNvPr id="10" name="Tekstfelt 9"/>
+          <p:cNvSpPr txBox="1"/>
+          <p:nvPr/>
+        </p:nvSpPr>
+        <p:spPr>
+          <a:xfrm>
+            <a:off x="4067944" y="4509120"/>
+            <a:ext cx="504056" cy="519351"/>
+          </a:xfrm>
+          <a:prstGeom prst="ellipse">
+            <a:avLst/>
+          </a:prstGeom>
+          <a:effectLst/>
+        </p:spPr>
+        <p:style>
+          <a:lnRef idx="3">
+            <a:schemeClr val="lt1"/>
+          </a:lnRef>
+          <a:fillRef idx="1">
+            <a:schemeClr val="accent1"/>
+          </a:fillRef>
+          <a:effectRef idx="1">
+            <a:schemeClr val="accent1"/>
+          </a:effectRef>
+          <a:fontRef idx="minor">
+            <a:schemeClr val="lt1"/>
+          </a:fontRef>
+        </p:style>
+        <p:txBody>
+          <a:bodyPr wrap="square" rtlCol="0">
+            <a:spAutoFit/>
+          </a:bodyPr>
+          <a:lstStyle/>
+          <a:p>
+            <a:pPr algn="ctr"/>
+            <a:r>
+              <a:rPr lang="da-DK" dirty="0" smtClean="0"/>
+              <a:t>6</a:t>
+            </a:r>
+            <a:endParaRPr lang="da-DK" dirty="0"/>
+          </a:p>
+        </p:txBody>
+      </p:sp>
+      <p:sp>
+        <p:nvSpPr>
+          <p:cNvPr id="11" name="Tekstfelt 10"/>
+          <p:cNvSpPr txBox="1"/>
+          <p:nvPr/>
+        </p:nvSpPr>
+        <p:spPr>
+          <a:xfrm>
+            <a:off x="3491880" y="3645024"/>
+            <a:ext cx="504056" cy="519351"/>
+          </a:xfrm>
+          <a:prstGeom prst="ellipse">
+            <a:avLst/>
+          </a:prstGeom>
+          <a:effectLst/>
+        </p:spPr>
+        <p:style>
+          <a:lnRef idx="3">
+            <a:schemeClr val="lt1"/>
+          </a:lnRef>
+          <a:fillRef idx="1">
+            <a:schemeClr val="accent1"/>
+          </a:fillRef>
+          <a:effectRef idx="1">
+            <a:schemeClr val="accent1"/>
+          </a:effectRef>
+          <a:fontRef idx="minor">
+            <a:schemeClr val="lt1"/>
+          </a:fontRef>
+        </p:style>
+        <p:txBody>
+          <a:bodyPr wrap="square" rtlCol="0">
+            <a:spAutoFit/>
+          </a:bodyPr>
+          <a:lstStyle/>
+          <a:p>
+            <a:pPr algn="ctr"/>
+            <a:r>
+              <a:rPr lang="da-DK" dirty="0" smtClean="0"/>
+              <a:t>7</a:t>
+            </a:r>
+            <a:endParaRPr lang="da-DK" dirty="0"/>
+          </a:p>
+        </p:txBody>
+      </p:sp>
+      <p:sp>
+        <p:nvSpPr>
+          <p:cNvPr id="12" name="Tekstfelt 11"/>
+          <p:cNvSpPr txBox="1"/>
+          <p:nvPr/>
+        </p:nvSpPr>
+        <p:spPr>
+          <a:xfrm>
+            <a:off x="5004048" y="3645024"/>
+            <a:ext cx="504056" cy="519351"/>
+          </a:xfrm>
+          <a:prstGeom prst="ellipse">
+            <a:avLst/>
+          </a:prstGeom>
+          <a:effectLst/>
+        </p:spPr>
+        <p:style>
+          <a:lnRef idx="3">
+            <a:schemeClr val="lt1"/>
+          </a:lnRef>
+          <a:fillRef idx="1">
+            <a:schemeClr val="accent1"/>
+          </a:fillRef>
+          <a:effectRef idx="1">
+            <a:schemeClr val="accent1"/>
+          </a:effectRef>
+          <a:fontRef idx="minor">
+            <a:schemeClr val="lt1"/>
+          </a:fontRef>
+        </p:style>
+        <p:txBody>
+          <a:bodyPr wrap="square" rtlCol="0">
+            <a:spAutoFit/>
+          </a:bodyPr>
+          <a:lstStyle/>
+          <a:p>
+            <a:pPr algn="ctr"/>
+            <a:r>
+              <a:rPr lang="da-DK" dirty="0" smtClean="0"/>
+              <a:t>8</a:t>
+            </a:r>
+            <a:endParaRPr lang="da-DK" dirty="0"/>
+          </a:p>
+        </p:txBody>
+      </p:sp>
+      <p:cxnSp>
+        <p:nvCxnSpPr>
+          <p:cNvPr id="13" name="Lige forbindelse 12"/>
+          <p:cNvCxnSpPr>
+            <a:stCxn id="4" idx="4"/>
+            <a:endCxn id="6" idx="0"/>
+          </p:cNvCxnSpPr>
+          <p:nvPr/>
+        </p:nvCxnSpPr>
+        <p:spPr>
+          <a:xfrm>
+            <a:off x="3671900" y="1474699"/>
+            <a:ext cx="0" cy="298117"/>
+          </a:xfrm>
+          <a:prstGeom prst="line">
+            <a:avLst/>
+          </a:prstGeom>
+        </p:spPr>
+        <p:style>
+          <a:lnRef idx="2">
+            <a:schemeClr val="accent1"/>
+          </a:lnRef>
+          <a:fillRef idx="0">
+            <a:schemeClr val="accent1"/>
+          </a:fillRef>
+          <a:effectRef idx="1">
+            <a:schemeClr val="accent1"/>
+          </a:effectRef>
+          <a:fontRef idx="minor">
+            <a:schemeClr val="tx1"/>
+          </a:fontRef>
+        </p:style>
+      </p:cxnSp>
+      <p:cxnSp>
+        <p:nvCxnSpPr>
+          <p:cNvPr id="14" name="Lige forbindelse 13"/>
+          <p:cNvCxnSpPr>
+            <a:stCxn id="6" idx="5"/>
+            <a:endCxn id="8" idx="1"/>
+          </p:cNvCxnSpPr>
+          <p:nvPr/>
+        </p:nvCxnSpPr>
+        <p:spPr>
+          <a:xfrm>
+            <a:off x="3850111" y="2216110"/>
+            <a:ext cx="435666" cy="568867"/>
+          </a:xfrm>
+          <a:prstGeom prst="line">
+            <a:avLst/>
+          </a:prstGeom>
+        </p:spPr>
+        <p:style>
+          <a:lnRef idx="2">
+            <a:schemeClr val="accent1"/>
+          </a:lnRef>
+          <a:fillRef idx="0">
+            <a:schemeClr val="accent1"/>
+          </a:fillRef>
+          <a:effectRef idx="1">
+            <a:schemeClr val="accent1"/>
+          </a:effectRef>
+          <a:fontRef idx="minor">
+            <a:schemeClr val="tx1"/>
+          </a:fontRef>
+        </p:style>
+      </p:cxnSp>
+      <p:cxnSp>
+        <p:nvCxnSpPr>
+          <p:cNvPr id="15" name="Lige forbindelse 14"/>
+          <p:cNvCxnSpPr>
+            <a:stCxn id="8" idx="5"/>
+            <a:endCxn id="12" idx="1"/>
+          </p:cNvCxnSpPr>
+          <p:nvPr/>
+        </p:nvCxnSpPr>
+        <p:spPr>
+          <a:xfrm>
+            <a:off x="4642199" y="3152214"/>
+            <a:ext cx="435666" cy="568867"/>
+          </a:xfrm>
+          <a:prstGeom prst="line">
+            <a:avLst/>
+          </a:prstGeom>
+        </p:spPr>
+        <p:style>
+          <a:lnRef idx="2">
+            <a:schemeClr val="accent1"/>
+          </a:lnRef>
+          <a:fillRef idx="0">
+            <a:schemeClr val="accent1"/>
+          </a:fillRef>
+          <a:effectRef idx="1">
+            <a:schemeClr val="accent1"/>
+          </a:effectRef>
+          <a:fontRef idx="minor">
+            <a:schemeClr val="tx1"/>
+          </a:fontRef>
+        </p:style>
+      </p:cxnSp>
+      <p:cxnSp>
+        <p:nvCxnSpPr>
+          <p:cNvPr id="17" name="Lige forbindelse 16"/>
+          <p:cNvCxnSpPr>
+            <a:stCxn id="11" idx="3"/>
+            <a:endCxn id="9" idx="7"/>
+          </p:cNvCxnSpPr>
+          <p:nvPr/>
+        </p:nvCxnSpPr>
+        <p:spPr>
+          <a:xfrm flipH="1">
+            <a:off x="3346055" y="4088318"/>
+            <a:ext cx="219642" cy="496859"/>
+          </a:xfrm>
+          <a:prstGeom prst="line">
+            <a:avLst/>
+          </a:prstGeom>
+        </p:spPr>
+        <p:style>
+          <a:lnRef idx="2">
+            <a:schemeClr val="accent1"/>
+          </a:lnRef>
+          <a:fillRef idx="0">
+            <a:schemeClr val="accent1"/>
+          </a:fillRef>
+          <a:effectRef idx="1">
+            <a:schemeClr val="accent1"/>
+          </a:effectRef>
+          <a:fontRef idx="minor">
+            <a:schemeClr val="tx1"/>
+          </a:fontRef>
+        </p:style>
+      </p:cxnSp>
+      <p:cxnSp>
+        <p:nvCxnSpPr>
+          <p:cNvPr id="18" name="Lige forbindelse 17"/>
+          <p:cNvCxnSpPr>
+            <a:stCxn id="8" idx="3"/>
+            <a:endCxn id="11" idx="7"/>
+          </p:cNvCxnSpPr>
+          <p:nvPr/>
+        </p:nvCxnSpPr>
+        <p:spPr>
+          <a:xfrm flipH="1">
+            <a:off x="3922119" y="3152214"/>
+            <a:ext cx="363658" cy="568867"/>
+          </a:xfrm>
+          <a:prstGeom prst="line">
+            <a:avLst/>
+          </a:prstGeom>
+        </p:spPr>
+        <p:style>
+          <a:lnRef idx="2">
+            <a:schemeClr val="accent1"/>
+          </a:lnRef>
+          <a:fillRef idx="0">
+            <a:schemeClr val="accent1"/>
+          </a:fillRef>
+          <a:effectRef idx="1">
+            <a:schemeClr val="accent1"/>
+          </a:effectRef>
+          <a:fontRef idx="minor">
+            <a:schemeClr val="tx1"/>
+          </a:fontRef>
+        </p:style>
+      </p:cxnSp>
+      <p:cxnSp>
+        <p:nvCxnSpPr>
+          <p:cNvPr id="19" name="Lige forbindelse 18"/>
+          <p:cNvCxnSpPr>
+            <a:stCxn id="11" idx="5"/>
+            <a:endCxn id="10" idx="1"/>
+          </p:cNvCxnSpPr>
+          <p:nvPr/>
+        </p:nvCxnSpPr>
+        <p:spPr>
+          <a:xfrm>
+            <a:off x="3922119" y="4088318"/>
+            <a:ext cx="219642" cy="496859"/>
+          </a:xfrm>
+          <a:prstGeom prst="line">
+            <a:avLst/>
+          </a:prstGeom>
+        </p:spPr>
+        <p:style>
+          <a:lnRef idx="2">
+            <a:schemeClr val="accent1"/>
+          </a:lnRef>
+          <a:fillRef idx="0">
+            <a:schemeClr val="accent1"/>
+          </a:fillRef>
+          <a:effectRef idx="1">
+            <a:schemeClr val="accent1"/>
+          </a:effectRef>
+          <a:fontRef idx="minor">
+            <a:schemeClr val="tx1"/>
+          </a:fontRef>
+        </p:style>
+      </p:cxnSp>
+      <p:sp>
+        <p:nvSpPr>
+          <p:cNvPr id="20" name="Tekstfelt 19"/>
+          <p:cNvSpPr txBox="1"/>
+          <p:nvPr/>
+        </p:nvSpPr>
+        <p:spPr>
+          <a:xfrm>
+            <a:off x="5148064" y="1844824"/>
+            <a:ext cx="1083875" cy="369332"/>
+          </a:xfrm>
+          <a:prstGeom prst="rect">
+            <a:avLst/>
+          </a:prstGeom>
+          <a:noFill/>
+        </p:spPr>
+        <p:txBody>
+          <a:bodyPr wrap="none" rtlCol="0">
+            <a:spAutoFit/>
+          </a:bodyPr>
+          <a:lstStyle/>
+          <a:p>
+            <a:r>
+              <a:rPr lang="da-DK" dirty="0" smtClean="0"/>
+              <a:t>First level</a:t>
+            </a:r>
+            <a:endParaRPr lang="da-DK" dirty="0"/>
+          </a:p>
+        </p:txBody>
+      </p:sp>
+      <p:sp>
+        <p:nvSpPr>
+          <p:cNvPr id="21" name="Tekstfelt 20"/>
+          <p:cNvSpPr txBox="1"/>
+          <p:nvPr/>
+        </p:nvSpPr>
+        <p:spPr>
+          <a:xfrm>
+            <a:off x="5652120" y="2780928"/>
+            <a:ext cx="1359567" cy="369332"/>
+          </a:xfrm>
+          <a:prstGeom prst="rect">
+            <a:avLst/>
+          </a:prstGeom>
+          <a:noFill/>
+        </p:spPr>
+        <p:txBody>
+          <a:bodyPr wrap="none" rtlCol="0">
+            <a:spAutoFit/>
+          </a:bodyPr>
+          <a:lstStyle/>
+          <a:p>
+            <a:r>
+              <a:rPr lang="da-DK" dirty="0" smtClean="0"/>
+              <a:t>Second level</a:t>
+            </a:r>
+            <a:endParaRPr lang="da-DK" dirty="0"/>
+          </a:p>
+        </p:txBody>
+      </p:sp>
+      <p:sp>
+        <p:nvSpPr>
+          <p:cNvPr id="22" name="Tekstfelt 21"/>
+          <p:cNvSpPr txBox="1"/>
+          <p:nvPr/>
+        </p:nvSpPr>
+        <p:spPr>
+          <a:xfrm>
+            <a:off x="6372200" y="3789040"/>
+            <a:ext cx="1165253" cy="369332"/>
+          </a:xfrm>
+          <a:prstGeom prst="rect">
+            <a:avLst/>
+          </a:prstGeom>
+          <a:noFill/>
+        </p:spPr>
+        <p:txBody>
+          <a:bodyPr wrap="none" rtlCol="0">
+            <a:spAutoFit/>
+          </a:bodyPr>
+          <a:lstStyle/>
+          <a:p>
+            <a:r>
+              <a:rPr lang="da-DK" dirty="0" smtClean="0"/>
+              <a:t>Third level</a:t>
+            </a:r>
+            <a:endParaRPr lang="da-DK" dirty="0"/>
+          </a:p>
+        </p:txBody>
+      </p:sp>
+      <p:sp>
+        <p:nvSpPr>
+          <p:cNvPr id="31" name="Tekstfelt 30"/>
+          <p:cNvSpPr txBox="1"/>
+          <p:nvPr/>
+        </p:nvSpPr>
+        <p:spPr>
+          <a:xfrm>
+            <a:off x="6372200" y="4581128"/>
+            <a:ext cx="1304902" cy="369332"/>
+          </a:xfrm>
+          <a:prstGeom prst="rect">
+            <a:avLst/>
+          </a:prstGeom>
+          <a:noFill/>
+        </p:spPr>
+        <p:txBody>
+          <a:bodyPr wrap="none" rtlCol="0">
+            <a:spAutoFit/>
+          </a:bodyPr>
+          <a:lstStyle/>
+          <a:p>
+            <a:r>
+              <a:rPr lang="da-DK" dirty="0" smtClean="0"/>
+              <a:t>Fourth </a:t>
+            </a:r>
+            <a:r>
+              <a:rPr lang="da-DK" dirty="0" smtClean="0"/>
+              <a:t>level</a:t>
+            </a:r>
+            <a:endParaRPr lang="da-DK" dirty="0"/>
+          </a:p>
+        </p:txBody>
+      </p:sp>
+    </p:spTree>
+    <p:extLst>
+      <p:ext uri="{BB962C8B-B14F-4D97-AF65-F5344CB8AC3E}">
+        <p14:creationId xmlns:p14="http://schemas.microsoft.com/office/powerpoint/2010/main" val="700188050"/>
+      </p:ext>
+    </p:extLst>
+  </p:cSld>
+  <p:clrMapOvr>
+    <a:masterClrMapping/>
+  </p:clrMapOvr>
+</p:sld>
+</file>
+
 <file path=ppt/theme/theme1.xml><?xml version="1.0" encoding="utf-8"?>
 <a:theme xmlns:a="http://schemas.openxmlformats.org/drawingml/2006/main" name="Office-tema">
   <a:themeElements>

</xml_diff>

<commit_message>
Forside, og fuck jer
</commit_message>
<xml_diff>
--- a/Rapport/figures/Golf_course_1_representation.pptx
+++ b/Rapport/figures/Golf_course_1_representation.pptx
@@ -293,7 +293,7 @@
           <a:p>
             <a:fld id="{4751A7D4-8245-46D1-BEB1-C49E0A45E190}" type="datetimeFigureOut">
               <a:rPr lang="nb-NO" smtClean="0"/>
-              <a:t>07.12.2015</a:t>
+              <a:t>16/12/15</a:t>
             </a:fld>
             <a:endParaRPr lang="nb-NO"/>
           </a:p>
@@ -335,7 +335,7 @@
           <a:p>
             <a:fld id="{BE492CC2-7F9C-40DD-BA2E-93D574C7CF5B}" type="slidenum">
               <a:rPr lang="nb-NO" smtClean="0"/>
-              <a:t>‹#›</a:t>
+              <a:t>‹nr.›</a:t>
             </a:fld>
             <a:endParaRPr lang="nb-NO"/>
           </a:p>
@@ -463,7 +463,7 @@
           <a:p>
             <a:fld id="{4751A7D4-8245-46D1-BEB1-C49E0A45E190}" type="datetimeFigureOut">
               <a:rPr lang="nb-NO" smtClean="0"/>
-              <a:t>07.12.2015</a:t>
+              <a:t>16/12/15</a:t>
             </a:fld>
             <a:endParaRPr lang="nb-NO"/>
           </a:p>
@@ -505,7 +505,7 @@
           <a:p>
             <a:fld id="{BE492CC2-7F9C-40DD-BA2E-93D574C7CF5B}" type="slidenum">
               <a:rPr lang="nb-NO" smtClean="0"/>
-              <a:t>‹#›</a:t>
+              <a:t>‹nr.›</a:t>
             </a:fld>
             <a:endParaRPr lang="nb-NO"/>
           </a:p>
@@ -643,7 +643,7 @@
           <a:p>
             <a:fld id="{4751A7D4-8245-46D1-BEB1-C49E0A45E190}" type="datetimeFigureOut">
               <a:rPr lang="nb-NO" smtClean="0"/>
-              <a:t>07.12.2015</a:t>
+              <a:t>16/12/15</a:t>
             </a:fld>
             <a:endParaRPr lang="nb-NO"/>
           </a:p>
@@ -685,7 +685,7 @@
           <a:p>
             <a:fld id="{BE492CC2-7F9C-40DD-BA2E-93D574C7CF5B}" type="slidenum">
               <a:rPr lang="nb-NO" smtClean="0"/>
-              <a:t>‹#›</a:t>
+              <a:t>‹nr.›</a:t>
             </a:fld>
             <a:endParaRPr lang="nb-NO"/>
           </a:p>
@@ -813,7 +813,7 @@
           <a:p>
             <a:fld id="{4751A7D4-8245-46D1-BEB1-C49E0A45E190}" type="datetimeFigureOut">
               <a:rPr lang="nb-NO" smtClean="0"/>
-              <a:t>07.12.2015</a:t>
+              <a:t>16/12/15</a:t>
             </a:fld>
             <a:endParaRPr lang="nb-NO"/>
           </a:p>
@@ -855,7 +855,7 @@
           <a:p>
             <a:fld id="{BE492CC2-7F9C-40DD-BA2E-93D574C7CF5B}" type="slidenum">
               <a:rPr lang="nb-NO" smtClean="0"/>
-              <a:t>‹#›</a:t>
+              <a:t>‹nr.›</a:t>
             </a:fld>
             <a:endParaRPr lang="nb-NO"/>
           </a:p>
@@ -1059,7 +1059,7 @@
           <a:p>
             <a:fld id="{4751A7D4-8245-46D1-BEB1-C49E0A45E190}" type="datetimeFigureOut">
               <a:rPr lang="nb-NO" smtClean="0"/>
-              <a:t>07.12.2015</a:t>
+              <a:t>16/12/15</a:t>
             </a:fld>
             <a:endParaRPr lang="nb-NO"/>
           </a:p>
@@ -1101,7 +1101,7 @@
           <a:p>
             <a:fld id="{BE492CC2-7F9C-40DD-BA2E-93D574C7CF5B}" type="slidenum">
               <a:rPr lang="nb-NO" smtClean="0"/>
-              <a:t>‹#›</a:t>
+              <a:t>‹nr.›</a:t>
             </a:fld>
             <a:endParaRPr lang="nb-NO"/>
           </a:p>
@@ -1347,7 +1347,7 @@
           <a:p>
             <a:fld id="{4751A7D4-8245-46D1-BEB1-C49E0A45E190}" type="datetimeFigureOut">
               <a:rPr lang="nb-NO" smtClean="0"/>
-              <a:t>07.12.2015</a:t>
+              <a:t>16/12/15</a:t>
             </a:fld>
             <a:endParaRPr lang="nb-NO"/>
           </a:p>
@@ -1389,7 +1389,7 @@
           <a:p>
             <a:fld id="{BE492CC2-7F9C-40DD-BA2E-93D574C7CF5B}" type="slidenum">
               <a:rPr lang="nb-NO" smtClean="0"/>
-              <a:t>‹#›</a:t>
+              <a:t>‹nr.›</a:t>
             </a:fld>
             <a:endParaRPr lang="nb-NO"/>
           </a:p>
@@ -1769,7 +1769,7 @@
           <a:p>
             <a:fld id="{4751A7D4-8245-46D1-BEB1-C49E0A45E190}" type="datetimeFigureOut">
               <a:rPr lang="nb-NO" smtClean="0"/>
-              <a:t>07.12.2015</a:t>
+              <a:t>16/12/15</a:t>
             </a:fld>
             <a:endParaRPr lang="nb-NO"/>
           </a:p>
@@ -1811,7 +1811,7 @@
           <a:p>
             <a:fld id="{BE492CC2-7F9C-40DD-BA2E-93D574C7CF5B}" type="slidenum">
               <a:rPr lang="nb-NO" smtClean="0"/>
-              <a:t>‹#›</a:t>
+              <a:t>‹nr.›</a:t>
             </a:fld>
             <a:endParaRPr lang="nb-NO"/>
           </a:p>
@@ -1887,7 +1887,7 @@
           <a:p>
             <a:fld id="{4751A7D4-8245-46D1-BEB1-C49E0A45E190}" type="datetimeFigureOut">
               <a:rPr lang="nb-NO" smtClean="0"/>
-              <a:t>07.12.2015</a:t>
+              <a:t>16/12/15</a:t>
             </a:fld>
             <a:endParaRPr lang="nb-NO"/>
           </a:p>
@@ -1929,7 +1929,7 @@
           <a:p>
             <a:fld id="{BE492CC2-7F9C-40DD-BA2E-93D574C7CF5B}" type="slidenum">
               <a:rPr lang="nb-NO" smtClean="0"/>
-              <a:t>‹#›</a:t>
+              <a:t>‹nr.›</a:t>
             </a:fld>
             <a:endParaRPr lang="nb-NO"/>
           </a:p>
@@ -1982,7 +1982,7 @@
           <a:p>
             <a:fld id="{4751A7D4-8245-46D1-BEB1-C49E0A45E190}" type="datetimeFigureOut">
               <a:rPr lang="nb-NO" smtClean="0"/>
-              <a:t>07.12.2015</a:t>
+              <a:t>16/12/15</a:t>
             </a:fld>
             <a:endParaRPr lang="nb-NO"/>
           </a:p>
@@ -2024,7 +2024,7 @@
           <a:p>
             <a:fld id="{BE492CC2-7F9C-40DD-BA2E-93D574C7CF5B}" type="slidenum">
               <a:rPr lang="nb-NO" smtClean="0"/>
-              <a:t>‹#›</a:t>
+              <a:t>‹nr.›</a:t>
             </a:fld>
             <a:endParaRPr lang="nb-NO"/>
           </a:p>
@@ -2259,7 +2259,7 @@
           <a:p>
             <a:fld id="{4751A7D4-8245-46D1-BEB1-C49E0A45E190}" type="datetimeFigureOut">
               <a:rPr lang="nb-NO" smtClean="0"/>
-              <a:t>07.12.2015</a:t>
+              <a:t>16/12/15</a:t>
             </a:fld>
             <a:endParaRPr lang="nb-NO"/>
           </a:p>
@@ -2301,7 +2301,7 @@
           <a:p>
             <a:fld id="{BE492CC2-7F9C-40DD-BA2E-93D574C7CF5B}" type="slidenum">
               <a:rPr lang="nb-NO" smtClean="0"/>
-              <a:t>‹#›</a:t>
+              <a:t>‹nr.›</a:t>
             </a:fld>
             <a:endParaRPr lang="nb-NO"/>
           </a:p>
@@ -2512,7 +2512,7 @@
           <a:p>
             <a:fld id="{4751A7D4-8245-46D1-BEB1-C49E0A45E190}" type="datetimeFigureOut">
               <a:rPr lang="nb-NO" smtClean="0"/>
-              <a:t>07.12.2015</a:t>
+              <a:t>16/12/15</a:t>
             </a:fld>
             <a:endParaRPr lang="nb-NO"/>
           </a:p>
@@ -2554,7 +2554,7 @@
           <a:p>
             <a:fld id="{BE492CC2-7F9C-40DD-BA2E-93D574C7CF5B}" type="slidenum">
               <a:rPr lang="nb-NO" smtClean="0"/>
-              <a:t>‹#›</a:t>
+              <a:t>‹nr.›</a:t>
             </a:fld>
             <a:endParaRPr lang="nb-NO"/>
           </a:p>
@@ -2725,7 +2725,7 @@
           <a:p>
             <a:fld id="{4751A7D4-8245-46D1-BEB1-C49E0A45E190}" type="datetimeFigureOut">
               <a:rPr lang="nb-NO" smtClean="0"/>
-              <a:t>07.12.2015</a:t>
+              <a:t>16/12/15</a:t>
             </a:fld>
             <a:endParaRPr lang="nb-NO"/>
           </a:p>
@@ -2803,7 +2803,7 @@
           <a:p>
             <a:fld id="{BE492CC2-7F9C-40DD-BA2E-93D574C7CF5B}" type="slidenum">
               <a:rPr lang="nb-NO" smtClean="0"/>
-              <a:t>‹#›</a:t>
+              <a:t>‹nr.›</a:t>
             </a:fld>
             <a:endParaRPr lang="nb-NO"/>
           </a:p>
@@ -3146,7 +3146,7 @@
         </p:nvSpPr>
         <p:spPr>
           <a:xfrm>
-            <a:off x="7361528" y="2132856"/>
+            <a:off x="7308304" y="1988840"/>
             <a:ext cx="144016" cy="360040"/>
           </a:xfrm>
           <a:prstGeom prst="flowChartSort">
@@ -3184,7 +3184,7 @@
         </p:nvSpPr>
         <p:spPr>
           <a:xfrm>
-            <a:off x="3635896" y="2348880"/>
+            <a:off x="3707904" y="2420888"/>
             <a:ext cx="144016" cy="360040"/>
           </a:xfrm>
           <a:prstGeom prst="flowChartSort">
@@ -3222,7 +3222,7 @@
         </p:nvSpPr>
         <p:spPr>
           <a:xfrm>
-            <a:off x="5414679" y="1936172"/>
+            <a:off x="5436096" y="1988840"/>
             <a:ext cx="144016" cy="360040"/>
           </a:xfrm>
           <a:prstGeom prst="flowChartSort">
@@ -3260,7 +3260,7 @@
         </p:nvSpPr>
         <p:spPr>
           <a:xfrm>
-            <a:off x="1763688" y="764704"/>
+            <a:off x="1691680" y="764704"/>
             <a:ext cx="144016" cy="360040"/>
           </a:xfrm>
           <a:prstGeom prst="flowChartSort">
@@ -3374,7 +3374,7 @@
         </p:nvSpPr>
         <p:spPr>
           <a:xfrm rot="10298829">
-            <a:off x="6636866" y="1921827"/>
+            <a:off x="6636866" y="1865805"/>
             <a:ext cx="337153" cy="661407"/>
           </a:xfrm>
           <a:prstGeom prst="arc">
@@ -3604,7 +3604,7 @@
         </p:nvSpPr>
         <p:spPr>
           <a:xfrm rot="9918352">
-            <a:off x="4218325" y="1998902"/>
+            <a:off x="4300490" y="2087576"/>
             <a:ext cx="337153" cy="661407"/>
           </a:xfrm>
           <a:prstGeom prst="arc">
@@ -3650,7 +3650,7 @@
         </p:nvSpPr>
         <p:spPr>
           <a:xfrm rot="10298829">
-            <a:off x="3106084" y="2470964"/>
+            <a:off x="3180482" y="2470964"/>
             <a:ext cx="337153" cy="661407"/>
           </a:xfrm>
           <a:prstGeom prst="arc">
@@ -3736,13 +3736,13 @@
       </p:sp>
       <p:sp>
         <p:nvSpPr>
-          <p:cNvPr id="27" name="Bue 26"/>
+          <p:cNvPr id="31" name="Bue 30"/>
           <p:cNvSpPr/>
           <p:nvPr/>
         </p:nvSpPr>
         <p:spPr>
-          <a:xfrm rot="3621643">
-            <a:off x="1800375" y="861744"/>
+          <a:xfrm rot="7369049">
+            <a:off x="1512993" y="3596086"/>
             <a:ext cx="337153" cy="661407"/>
           </a:xfrm>
           <a:prstGeom prst="arc">
@@ -3782,13 +3782,13 @@
       </p:sp>
       <p:sp>
         <p:nvSpPr>
-          <p:cNvPr id="28" name="Bue 27"/>
+          <p:cNvPr id="32" name="Bue 31"/>
           <p:cNvSpPr/>
           <p:nvPr/>
         </p:nvSpPr>
         <p:spPr>
-          <a:xfrm rot="3621643">
-            <a:off x="2232423" y="1092593"/>
+          <a:xfrm rot="16569927">
+            <a:off x="7198592" y="2653344"/>
             <a:ext cx="337153" cy="661407"/>
           </a:xfrm>
           <a:prstGeom prst="arc">
@@ -3828,13 +3828,13 @@
       </p:sp>
       <p:sp>
         <p:nvSpPr>
-          <p:cNvPr id="29" name="Bue 28"/>
+          <p:cNvPr id="33" name="Bue 32"/>
           <p:cNvSpPr/>
           <p:nvPr/>
         </p:nvSpPr>
         <p:spPr>
-          <a:xfrm rot="3135242">
-            <a:off x="2670577" y="1351207"/>
+          <a:xfrm rot="16200000" flipH="1">
+            <a:off x="1709791" y="1322657"/>
             <a:ext cx="337153" cy="661407"/>
           </a:xfrm>
           <a:prstGeom prst="arc">
@@ -3874,13 +3874,13 @@
       </p:sp>
       <p:sp>
         <p:nvSpPr>
-          <p:cNvPr id="30" name="Bue 29"/>
+          <p:cNvPr id="34" name="Bue 33"/>
           <p:cNvSpPr/>
           <p:nvPr/>
         </p:nvSpPr>
         <p:spPr>
-          <a:xfrm rot="3018022">
-            <a:off x="3105194" y="1616438"/>
+          <a:xfrm rot="16200000" flipH="1">
+            <a:off x="1768464" y="1705584"/>
             <a:ext cx="337153" cy="661407"/>
           </a:xfrm>
           <a:prstGeom prst="arc">
@@ -3920,13 +3920,13 @@
       </p:sp>
       <p:sp>
         <p:nvSpPr>
-          <p:cNvPr id="31" name="Bue 30"/>
+          <p:cNvPr id="35" name="Bue 34"/>
           <p:cNvSpPr/>
           <p:nvPr/>
         </p:nvSpPr>
         <p:spPr>
-          <a:xfrm rot="7369049">
-            <a:off x="1512993" y="3596086"/>
+          <a:xfrm rot="16200000" flipH="1">
+            <a:off x="1840472" y="2114746"/>
             <a:ext cx="337153" cy="661407"/>
           </a:xfrm>
           <a:prstGeom prst="arc">
@@ -3966,13 +3966,13 @@
       </p:sp>
       <p:sp>
         <p:nvSpPr>
-          <p:cNvPr id="32" name="Bue 31"/>
+          <p:cNvPr id="36" name="Bue 35"/>
           <p:cNvSpPr/>
           <p:nvPr/>
         </p:nvSpPr>
         <p:spPr>
-          <a:xfrm rot="16569927">
-            <a:off x="7198592" y="2691538"/>
+          <a:xfrm rot="16200000" flipH="1">
+            <a:off x="1637783" y="962617"/>
             <a:ext cx="337153" cy="661407"/>
           </a:xfrm>
           <a:prstGeom prst="arc">
@@ -4010,144 +4010,6 @@
           </a:p>
         </p:txBody>
       </p:sp>
-      <p:sp>
-        <p:nvSpPr>
-          <p:cNvPr id="33" name="Bue 32"/>
-          <p:cNvSpPr/>
-          <p:nvPr/>
-        </p:nvSpPr>
-        <p:spPr>
-          <a:xfrm rot="16200000" flipH="1">
-            <a:off x="1781799" y="1250649"/>
-            <a:ext cx="337153" cy="661407"/>
-          </a:xfrm>
-          <a:prstGeom prst="arc">
-            <a:avLst>
-              <a:gd name="adj1" fmla="val 16724199"/>
-              <a:gd name="adj2" fmla="val 5034208"/>
-            </a:avLst>
-          </a:prstGeom>
-          <a:ln>
-            <a:solidFill>
-              <a:srgbClr val="FFFF00"/>
-            </a:solidFill>
-          </a:ln>
-        </p:spPr>
-        <p:style>
-          <a:lnRef idx="2">
-            <a:schemeClr val="accent6"/>
-          </a:lnRef>
-          <a:fillRef idx="0">
-            <a:schemeClr val="accent6"/>
-          </a:fillRef>
-          <a:effectRef idx="1">
-            <a:schemeClr val="accent6"/>
-          </a:effectRef>
-          <a:fontRef idx="minor">
-            <a:schemeClr val="tx1"/>
-          </a:fontRef>
-        </p:style>
-        <p:txBody>
-          <a:bodyPr rtlCol="0" anchor="ctr"/>
-          <a:lstStyle/>
-          <a:p>
-            <a:pPr algn="ctr"/>
-            <a:endParaRPr lang="nb-NO"/>
-          </a:p>
-        </p:txBody>
-      </p:sp>
-      <p:sp>
-        <p:nvSpPr>
-          <p:cNvPr id="34" name="Bue 33"/>
-          <p:cNvSpPr/>
-          <p:nvPr/>
-        </p:nvSpPr>
-        <p:spPr>
-          <a:xfrm rot="16200000" flipH="1">
-            <a:off x="1781799" y="1682697"/>
-            <a:ext cx="337153" cy="661407"/>
-          </a:xfrm>
-          <a:prstGeom prst="arc">
-            <a:avLst>
-              <a:gd name="adj1" fmla="val 16724199"/>
-              <a:gd name="adj2" fmla="val 5034208"/>
-            </a:avLst>
-          </a:prstGeom>
-          <a:ln>
-            <a:solidFill>
-              <a:srgbClr val="FFFF00"/>
-            </a:solidFill>
-          </a:ln>
-        </p:spPr>
-        <p:style>
-          <a:lnRef idx="2">
-            <a:schemeClr val="accent6"/>
-          </a:lnRef>
-          <a:fillRef idx="0">
-            <a:schemeClr val="accent6"/>
-          </a:fillRef>
-          <a:effectRef idx="1">
-            <a:schemeClr val="accent6"/>
-          </a:effectRef>
-          <a:fontRef idx="minor">
-            <a:schemeClr val="tx1"/>
-          </a:fontRef>
-        </p:style>
-        <p:txBody>
-          <a:bodyPr rtlCol="0" anchor="ctr"/>
-          <a:lstStyle/>
-          <a:p>
-            <a:pPr algn="ctr"/>
-            <a:endParaRPr lang="nb-NO"/>
-          </a:p>
-        </p:txBody>
-      </p:sp>
-      <p:sp>
-        <p:nvSpPr>
-          <p:cNvPr id="35" name="Bue 34"/>
-          <p:cNvSpPr/>
-          <p:nvPr/>
-        </p:nvSpPr>
-        <p:spPr>
-          <a:xfrm rot="16200000" flipH="1">
-            <a:off x="1840472" y="2114746"/>
-            <a:ext cx="337153" cy="661407"/>
-          </a:xfrm>
-          <a:prstGeom prst="arc">
-            <a:avLst>
-              <a:gd name="adj1" fmla="val 16724199"/>
-              <a:gd name="adj2" fmla="val 5034208"/>
-            </a:avLst>
-          </a:prstGeom>
-          <a:ln>
-            <a:solidFill>
-              <a:srgbClr val="FFFF00"/>
-            </a:solidFill>
-          </a:ln>
-        </p:spPr>
-        <p:style>
-          <a:lnRef idx="2">
-            <a:schemeClr val="accent6"/>
-          </a:lnRef>
-          <a:fillRef idx="0">
-            <a:schemeClr val="accent6"/>
-          </a:fillRef>
-          <a:effectRef idx="1">
-            <a:schemeClr val="accent6"/>
-          </a:effectRef>
-          <a:fontRef idx="minor">
-            <a:schemeClr val="tx1"/>
-          </a:fontRef>
-        </p:style>
-        <p:txBody>
-          <a:bodyPr rtlCol="0" anchor="ctr"/>
-          <a:lstStyle/>
-          <a:p>
-            <a:pPr algn="ctr"/>
-            <a:endParaRPr lang="nb-NO"/>
-          </a:p>
-        </p:txBody>
-      </p:sp>
     </p:spTree>
     <p:extLst>
       <p:ext uri="{BB962C8B-B14F-4D97-AF65-F5344CB8AC3E}">
@@ -4161,7 +4023,7 @@
   <p:timing>
     <p:tnLst>
       <p:par>
-        <p:cTn id="1" dur="indefinite" restart="never" nodeType="tmRoot"/>
+        <p:cTn xmlns:p14="http://schemas.microsoft.com/office/powerpoint/2010/main" id="1" dur="indefinite" restart="never" nodeType="tmRoot"/>
       </p:par>
     </p:tnLst>
   </p:timing>
@@ -6162,7 +6024,7 @@
           </a:prstGeom>
           <a:noFill/>
           <a:extLst>
-            <a:ext uri="{909E8E84-426E-40DD-AFC4-6F175D3DCCD1}">
+            <a:ext uri="{909E8E84-426E-40dd-AFC4-6F175D3DCCD1}">
               <a14:hiddenFill xmlns:a14="http://schemas.microsoft.com/office/drawing/2010/main">
                 <a:solidFill>
                   <a:srgbClr val="FFFFFF"/>
@@ -6203,7 +6065,7 @@
           </a:prstGeom>
           <a:noFill/>
           <a:extLst>
-            <a:ext uri="{909E8E84-426E-40DD-AFC4-6F175D3DCCD1}">
+            <a:ext uri="{909E8E84-426E-40dd-AFC4-6F175D3DCCD1}">
               <a14:hiddenFill xmlns:a14="http://schemas.microsoft.com/office/drawing/2010/main">
                 <a:solidFill>
                   <a:srgbClr val="FFFFFF"/>
@@ -6244,7 +6106,7 @@
           </a:prstGeom>
           <a:noFill/>
           <a:extLst>
-            <a:ext uri="{909E8E84-426E-40DD-AFC4-6F175D3DCCD1}">
+            <a:ext uri="{909E8E84-426E-40dd-AFC4-6F175D3DCCD1}">
               <a14:hiddenFill xmlns:a14="http://schemas.microsoft.com/office/drawing/2010/main">
                 <a:solidFill>
                   <a:srgbClr val="FFFFFF"/>
@@ -6285,7 +6147,7 @@
           </a:prstGeom>
           <a:noFill/>
           <a:extLst>
-            <a:ext uri="{909E8E84-426E-40DD-AFC4-6F175D3DCCD1}">
+            <a:ext uri="{909E8E84-426E-40dd-AFC4-6F175D3DCCD1}">
               <a14:hiddenFill xmlns:a14="http://schemas.microsoft.com/office/drawing/2010/main">
                 <a:solidFill>
                   <a:srgbClr val="FFFFFF"/>
@@ -6740,7 +6602,7 @@
           </a:prstGeom>
           <a:noFill/>
           <a:extLst>
-            <a:ext uri="{909E8E84-426E-40DD-AFC4-6F175D3DCCD1}">
+            <a:ext uri="{909E8E84-426E-40dd-AFC4-6F175D3DCCD1}">
               <a14:hiddenFill xmlns:a14="http://schemas.microsoft.com/office/drawing/2010/main">
                 <a:solidFill>
                   <a:srgbClr val="FFFFFF"/>
@@ -6919,7 +6781,7 @@
           </a:prstGeom>
           <a:noFill/>
           <a:extLst>
-            <a:ext uri="{909E8E84-426E-40DD-AFC4-6F175D3DCCD1}">
+            <a:ext uri="{909E8E84-426E-40dd-AFC4-6F175D3DCCD1}">
               <a14:hiddenFill xmlns:a14="http://schemas.microsoft.com/office/drawing/2010/main">
                 <a:solidFill>
                   <a:srgbClr val="FFFFFF"/>

</xml_diff>